<commit_message>
Updated format of lesson
</commit_message>
<xml_diff>
--- a/translations/en-us/advanced/MenuSystem.pptx
+++ b/translations/en-us/advanced/MenuSystem.pptx
@@ -2,7 +2,7 @@
 <file path=ppt/presentation.xml><?xml version="1.0" encoding="utf-8"?>
 <p:presentation xmlns:a="http://schemas.openxmlformats.org/drawingml/2006/main" xmlns:r="http://schemas.openxmlformats.org/officeDocument/2006/relationships" xmlns:p="http://schemas.openxmlformats.org/presentationml/2006/main" showSpecialPlsOnTitleSld="0" saveSubsetFonts="1">
   <p:sldMasterIdLst>
-    <p:sldMasterId id="2147483835" r:id="rId1"/>
+    <p:sldMasterId id="2147483845" r:id="rId1"/>
   </p:sldMasterIdLst>
   <p:notesMasterIdLst>
     <p:notesMasterId r:id="rId10"/>
@@ -218,7 +218,7 @@
           <a:p>
             <a:fld id="{E354B44E-40A3-0E46-B16A-9BF1250A248B}" type="datetimeFigureOut">
               <a:rPr lang="en-US" smtClean="0"/>
-              <a:t>11/15/15</a:t>
+              <a:t>2/10/17</a:t>
             </a:fld>
             <a:endParaRPr lang="en-US"/>
           </a:p>
@@ -384,7 +384,7 @@
           <a:p>
             <a:fld id="{C86AD16C-2DB4-6642-BAD4-9ED973A087A0}" type="datetimeFigureOut">
               <a:rPr lang="en-US" smtClean="0"/>
-              <a:t>11/15/15</a:t>
+              <a:t>2/10/17</a:t>
             </a:fld>
             <a:endParaRPr lang="en-US"/>
           </a:p>
@@ -853,9 +853,9 @@
           <a:bodyPr/>
           <a:lstStyle/>
           <a:p>
-            <a:fld id="{D75494F3-78AD-ED4B-BCBF-E61799859C18}" type="datetime1">
-              <a:rPr lang="en-US" smtClean="0"/>
-              <a:t>11/15/15</a:t>
+            <a:fld id="{725AFE7A-65D4-4E4C-9D2A-66E89FB66668}" type="datetime1">
+              <a:rPr lang="en-US" smtClean="0"/>
+              <a:t>2/10/17</a:t>
             </a:fld>
             <a:endParaRPr lang="en-US"/>
           </a:p>
@@ -878,7 +878,7 @@
           <a:p>
             <a:r>
               <a:rPr lang="sk-SK" smtClean="0"/>
-              <a:t>© 2015 EV3Lessons.com, Last edit 11/15/2015</a:t>
+              <a:t>© 2015 EV3Lessons.com, Last edit 02/10/2017</a:t>
             </a:r>
             <a:endParaRPr lang="en-US"/>
           </a:p>
@@ -1406,7 +1406,7 @@
           <a:noFill/>
           <a:extLst>
             <a:ext uri="{909E8E84-426E-40dd-AFC4-6F175D3DCCD1}">
-              <a14:hiddenFill xmlns:a14="http://schemas.microsoft.com/office/drawing/2010/main" xmlns="">
+              <a14:hiddenFill xmlns="" xmlns:a14="http://schemas.microsoft.com/office/drawing/2010/main">
                 <a:solidFill>
                   <a:srgbClr val="FFFFFF"/>
                 </a:solidFill>
@@ -1450,294 +1450,8 @@
           </a:fontRef>
         </p:style>
       </p:cxnSp>
-      <p:pic>
-        <p:nvPicPr>
-          <p:cNvPr id="12" name="Picture 11"/>
-          <p:cNvPicPr>
-            <a:picLocks noChangeAspect="1"/>
-          </p:cNvPicPr>
-          <p:nvPr/>
-        </p:nvPicPr>
-        <p:blipFill>
-          <a:blip r:embed="rId3">
-            <a:extLst>
-              <a:ext uri="{28A0092B-C50C-407E-A947-70E740481C1C}">
-                <a14:useLocalDpi xmlns:a14="http://schemas.microsoft.com/office/drawing/2010/main" val="0"/>
-              </a:ext>
-            </a:extLst>
-          </a:blip>
-          <a:stretch>
-            <a:fillRect/>
-          </a:stretch>
-        </p:blipFill>
-        <p:spPr>
-          <a:xfrm>
-            <a:off x="284163" y="4948514"/>
-            <a:ext cx="1265237" cy="1210410"/>
-          </a:xfrm>
-          <a:prstGeom prst="rect">
-            <a:avLst/>
-          </a:prstGeom>
-        </p:spPr>
-      </p:pic>
-      <p:sp>
-        <p:nvSpPr>
-          <p:cNvPr id="18" name="Subtitle 3"/>
-          <p:cNvSpPr txBox="1">
-            <a:spLocks/>
-          </p:cNvSpPr>
-          <p:nvPr/>
-        </p:nvSpPr>
-        <p:spPr>
-          <a:xfrm>
-            <a:off x="1549400" y="5829838"/>
-            <a:ext cx="3749229" cy="484094"/>
-          </a:xfrm>
-          <a:prstGeom prst="rect">
-            <a:avLst/>
-          </a:prstGeom>
-        </p:spPr>
-        <p:txBody>
-          <a:bodyPr vert="horz" lIns="91440" tIns="45720" rIns="91440" bIns="45720" rtlCol="0">
-            <a:normAutofit/>
-          </a:bodyPr>
-          <a:lstStyle>
-            <a:lvl1pPr marL="0" indent="0" algn="l" defTabSz="914400" rtl="0" eaLnBrk="1" latinLnBrk="0" hangingPunct="1">
-              <a:lnSpc>
-                <a:spcPct val="100000"/>
-              </a:lnSpc>
-              <a:spcBef>
-                <a:spcPts val="0"/>
-              </a:spcBef>
-              <a:buClr>
-                <a:schemeClr val="bg1">
-                  <a:lumMod val="65000"/>
-                </a:schemeClr>
-              </a:buClr>
-              <a:buSzPct val="90000"/>
-              <a:buFont typeface="Wingdings" pitchFamily="2" charset="2"/>
-              <a:buNone/>
-              <a:defRPr sz="1800" kern="1200">
-                <a:solidFill>
-                  <a:schemeClr val="bg1"/>
-                </a:solidFill>
-                <a:latin typeface="+mn-lt"/>
-                <a:ea typeface="+mn-ea"/>
-                <a:cs typeface="+mn-cs"/>
-              </a:defRPr>
-            </a:lvl1pPr>
-            <a:lvl2pPr marL="457200" indent="0" algn="ctr" defTabSz="914400" rtl="0" eaLnBrk="1" latinLnBrk="0" hangingPunct="1">
-              <a:spcBef>
-                <a:spcPts val="600"/>
-              </a:spcBef>
-              <a:buClr>
-                <a:schemeClr val="tx1">
-                  <a:lumMod val="75000"/>
-                  <a:lumOff val="25000"/>
-                </a:schemeClr>
-              </a:buClr>
-              <a:buSzPct val="90000"/>
-              <a:buFont typeface="Wingdings" pitchFamily="2" charset="2"/>
-              <a:buNone/>
-              <a:defRPr sz="2200" kern="1200">
-                <a:solidFill>
-                  <a:schemeClr val="tx1">
-                    <a:tint val="75000"/>
-                  </a:schemeClr>
-                </a:solidFill>
-                <a:latin typeface="+mn-lt"/>
-                <a:ea typeface="+mn-ea"/>
-                <a:cs typeface="+mn-cs"/>
-              </a:defRPr>
-            </a:lvl2pPr>
-            <a:lvl3pPr marL="914400" indent="0" algn="ctr" defTabSz="914400" rtl="0" eaLnBrk="1" latinLnBrk="0" hangingPunct="1">
-              <a:spcBef>
-                <a:spcPts val="600"/>
-              </a:spcBef>
-              <a:buClr>
-                <a:schemeClr val="bg1">
-                  <a:lumMod val="65000"/>
-                </a:schemeClr>
-              </a:buClr>
-              <a:buSzPct val="90000"/>
-              <a:buFont typeface="Wingdings" pitchFamily="2" charset="2"/>
-              <a:buNone/>
-              <a:defRPr sz="2000" kern="1200">
-                <a:solidFill>
-                  <a:schemeClr val="tx1">
-                    <a:tint val="75000"/>
-                  </a:schemeClr>
-                </a:solidFill>
-                <a:latin typeface="+mn-lt"/>
-                <a:ea typeface="+mn-ea"/>
-                <a:cs typeface="+mn-cs"/>
-              </a:defRPr>
-            </a:lvl3pPr>
-            <a:lvl4pPr marL="1371600" indent="0" algn="ctr" defTabSz="914400" rtl="0" eaLnBrk="1" latinLnBrk="0" hangingPunct="1">
-              <a:spcBef>
-                <a:spcPts val="600"/>
-              </a:spcBef>
-              <a:buClr>
-                <a:schemeClr val="tx1">
-                  <a:lumMod val="75000"/>
-                  <a:lumOff val="25000"/>
-                </a:schemeClr>
-              </a:buClr>
-              <a:buSzPct val="90000"/>
-              <a:buFont typeface="Wingdings" pitchFamily="2" charset="2"/>
-              <a:buNone/>
-              <a:defRPr sz="1800" kern="1200">
-                <a:solidFill>
-                  <a:schemeClr val="tx1">
-                    <a:tint val="75000"/>
-                  </a:schemeClr>
-                </a:solidFill>
-                <a:latin typeface="+mn-lt"/>
-                <a:ea typeface="+mn-ea"/>
-                <a:cs typeface="+mn-cs"/>
-              </a:defRPr>
-            </a:lvl4pPr>
-            <a:lvl5pPr marL="1828800" indent="0" algn="ctr" defTabSz="914400" rtl="0" eaLnBrk="1" latinLnBrk="0" hangingPunct="1">
-              <a:spcBef>
-                <a:spcPts val="600"/>
-              </a:spcBef>
-              <a:buClr>
-                <a:schemeClr val="bg1">
-                  <a:lumMod val="65000"/>
-                </a:schemeClr>
-              </a:buClr>
-              <a:buSzPct val="90000"/>
-              <a:buFont typeface="Wingdings" pitchFamily="2" charset="2"/>
-              <a:buNone/>
-              <a:defRPr sz="1800" kern="1200">
-                <a:solidFill>
-                  <a:schemeClr val="tx1">
-                    <a:tint val="75000"/>
-                  </a:schemeClr>
-                </a:solidFill>
-                <a:latin typeface="+mn-lt"/>
-                <a:ea typeface="+mn-ea"/>
-                <a:cs typeface="+mn-cs"/>
-              </a:defRPr>
-            </a:lvl5pPr>
-            <a:lvl6pPr marL="2286000" indent="0" algn="ctr" defTabSz="914400" rtl="0" eaLnBrk="1" latinLnBrk="0" hangingPunct="1">
-              <a:spcBef>
-                <a:spcPts val="600"/>
-              </a:spcBef>
-              <a:buClr>
-                <a:schemeClr val="tx1">
-                  <a:lumMod val="75000"/>
-                  <a:lumOff val="25000"/>
-                </a:schemeClr>
-              </a:buClr>
-              <a:buSzPct val="90000"/>
-              <a:buFont typeface="Wingdings" pitchFamily="2" charset="2"/>
-              <a:buNone/>
-              <a:defRPr lang="en-US" sz="1800" kern="1200">
-                <a:solidFill>
-                  <a:schemeClr val="tx1">
-                    <a:tint val="75000"/>
-                  </a:schemeClr>
-                </a:solidFill>
-                <a:latin typeface="+mn-lt"/>
-                <a:ea typeface="+mn-ea"/>
-                <a:cs typeface="+mn-cs"/>
-              </a:defRPr>
-            </a:lvl6pPr>
-            <a:lvl7pPr marL="2743200" indent="0" algn="ctr" defTabSz="914400" rtl="0" eaLnBrk="1" latinLnBrk="0" hangingPunct="1">
-              <a:spcBef>
-                <a:spcPts val="600"/>
-              </a:spcBef>
-              <a:buClr>
-                <a:schemeClr val="bg1">
-                  <a:lumMod val="65000"/>
-                </a:schemeClr>
-              </a:buClr>
-              <a:buSzPct val="90000"/>
-              <a:buFont typeface="Wingdings" pitchFamily="2" charset="2"/>
-              <a:buNone/>
-              <a:defRPr lang="en-US" sz="1800" kern="1200">
-                <a:solidFill>
-                  <a:schemeClr val="tx1">
-                    <a:tint val="75000"/>
-                  </a:schemeClr>
-                </a:solidFill>
-                <a:latin typeface="+mn-lt"/>
-                <a:ea typeface="+mn-ea"/>
-                <a:cs typeface="+mn-cs"/>
-              </a:defRPr>
-            </a:lvl7pPr>
-            <a:lvl8pPr marL="3200400" indent="0" algn="ctr" defTabSz="914400" rtl="0" eaLnBrk="1" latinLnBrk="0" hangingPunct="1">
-              <a:spcBef>
-                <a:spcPts val="600"/>
-              </a:spcBef>
-              <a:buClr>
-                <a:schemeClr val="tx1">
-                  <a:lumMod val="75000"/>
-                  <a:lumOff val="25000"/>
-                </a:schemeClr>
-              </a:buClr>
-              <a:buSzPct val="90000"/>
-              <a:buFont typeface="Wingdings" pitchFamily="2" charset="2"/>
-              <a:buNone/>
-              <a:defRPr lang="en-US" sz="1800" kern="1200">
-                <a:solidFill>
-                  <a:schemeClr val="tx1">
-                    <a:tint val="75000"/>
-                  </a:schemeClr>
-                </a:solidFill>
-                <a:latin typeface="+mn-lt"/>
-                <a:ea typeface="+mn-ea"/>
-                <a:cs typeface="+mn-cs"/>
-              </a:defRPr>
-            </a:lvl8pPr>
-            <a:lvl9pPr marL="3657600" indent="0" algn="ctr" defTabSz="914400" rtl="0" eaLnBrk="1" latinLnBrk="0" hangingPunct="1">
-              <a:spcBef>
-                <a:spcPts val="600"/>
-              </a:spcBef>
-              <a:buClr>
-                <a:schemeClr val="bg1">
-                  <a:lumMod val="65000"/>
-                </a:schemeClr>
-              </a:buClr>
-              <a:buSzPct val="90000"/>
-              <a:buFont typeface="Wingdings" pitchFamily="2" charset="2"/>
-              <a:buNone/>
-              <a:defRPr lang="en-US" sz="1800" kern="1200">
-                <a:solidFill>
-                  <a:schemeClr val="tx1">
-                    <a:tint val="75000"/>
-                  </a:schemeClr>
-                </a:solidFill>
-                <a:latin typeface="+mn-lt"/>
-                <a:ea typeface="+mn-ea"/>
-                <a:cs typeface="+mn-cs"/>
-              </a:defRPr>
-            </a:lvl9pPr>
-          </a:lstStyle>
-          <a:p>
-            <a:r>
-              <a:rPr lang="en-US" dirty="0" smtClean="0">
-                <a:solidFill>
-                  <a:schemeClr val="tx1"/>
-                </a:solidFill>
-              </a:rPr>
-              <a:t>By Droids Robotics</a:t>
-            </a:r>
-            <a:endParaRPr lang="en-US" dirty="0">
-              <a:solidFill>
-                <a:schemeClr val="tx1"/>
-              </a:solidFill>
-            </a:endParaRPr>
-          </a:p>
-        </p:txBody>
-      </p:sp>
     </p:spTree>
-    <p:extLst>
-      <p:ext uri="{BB962C8B-B14F-4D97-AF65-F5344CB8AC3E}">
-        <p14:creationId xmlns:p14="http://schemas.microsoft.com/office/powerpoint/2010/main" val="1507499562"/>
-      </p:ext>
-    </p:extLst>
+    <p:extLst/>
   </p:cSld>
   <p:clrMapOvr>
     <a:masterClrMapping/>
@@ -1840,9 +1554,9 @@
           <a:bodyPr/>
           <a:lstStyle/>
           <a:p>
-            <a:fld id="{65D4859D-911A-2843-AB85-2A43B3438177}" type="datetime1">
-              <a:rPr lang="en-US" smtClean="0"/>
-              <a:t>11/15/15</a:t>
+            <a:fld id="{16936579-90F3-4F43-98D6-D1136650F760}" type="datetime1">
+              <a:rPr lang="en-US" smtClean="0"/>
+              <a:t>2/10/17</a:t>
             </a:fld>
             <a:endParaRPr lang="en-US"/>
           </a:p>
@@ -1865,7 +1579,7 @@
           <a:p>
             <a:r>
               <a:rPr lang="sk-SK" smtClean="0"/>
-              <a:t>© 2015 EV3Lessons.com, Last edit 11/15/2015</a:t>
+              <a:t>© 2015 EV3Lessons.com, Last edit 02/10/2017</a:t>
             </a:r>
             <a:endParaRPr lang="en-US"/>
           </a:p>
@@ -2071,11 +1785,7 @@
         </p:txBody>
       </p:sp>
     </p:spTree>
-    <p:extLst>
-      <p:ext uri="{BB962C8B-B14F-4D97-AF65-F5344CB8AC3E}">
-        <p14:creationId xmlns:p14="http://schemas.microsoft.com/office/powerpoint/2010/main" val="533071228"/>
-      </p:ext>
-    </p:extLst>
+    <p:extLst/>
   </p:cSld>
   <p:clrMapOvr>
     <a:masterClrMapping/>
@@ -2303,9 +2013,9 @@
           <a:bodyPr/>
           <a:lstStyle/>
           <a:p>
-            <a:fld id="{EF1C29E2-79AB-F647-8A88-A94B0D8F674D}" type="datetime1">
-              <a:rPr lang="en-US" smtClean="0"/>
-              <a:t>11/15/15</a:t>
+            <a:fld id="{3DAAC15B-9056-774D-B603-2D55CA98627B}" type="datetime1">
+              <a:rPr lang="en-US" smtClean="0"/>
+              <a:t>2/10/17</a:t>
             </a:fld>
             <a:endParaRPr lang="en-US" dirty="0"/>
           </a:p>
@@ -2328,7 +2038,7 @@
           <a:p>
             <a:r>
               <a:rPr lang="sk-SK" smtClean="0"/>
-              <a:t>© 2015 EV3Lessons.com, Last edit 11/15/2015</a:t>
+              <a:t>© 2015 EV3Lessons.com, Last edit 02/10/2017</a:t>
             </a:r>
             <a:endParaRPr lang="en-US" dirty="0"/>
           </a:p>
@@ -2366,11 +2076,7 @@
         </p:txBody>
       </p:sp>
     </p:spTree>
-    <p:extLst>
-      <p:ext uri="{BB962C8B-B14F-4D97-AF65-F5344CB8AC3E}">
-        <p14:creationId xmlns:p14="http://schemas.microsoft.com/office/powerpoint/2010/main" val="26353712"/>
-      </p:ext>
-    </p:extLst>
+    <p:extLst/>
   </p:cSld>
   <p:clrMapOvr>
     <a:masterClrMapping/>
@@ -2767,9 +2473,9 @@
           <a:bodyPr/>
           <a:lstStyle/>
           <a:p>
-            <a:fld id="{98DFF9A4-58A9-084C-92A1-A241BE973AC5}" type="datetime1">
-              <a:rPr lang="en-US" smtClean="0"/>
-              <a:t>11/15/15</a:t>
+            <a:fld id="{49FA9E13-1725-7F49-B096-5E52531BE606}" type="datetime1">
+              <a:rPr lang="en-US" smtClean="0"/>
+              <a:t>2/10/17</a:t>
             </a:fld>
             <a:endParaRPr lang="en-US"/>
           </a:p>
@@ -2937,11 +2643,7 @@
         </p:txBody>
       </p:sp>
     </p:spTree>
-    <p:extLst>
-      <p:ext uri="{BB962C8B-B14F-4D97-AF65-F5344CB8AC3E}">
-        <p14:creationId xmlns:p14="http://schemas.microsoft.com/office/powerpoint/2010/main" val="545206302"/>
-      </p:ext>
-    </p:extLst>
+    <p:extLst/>
   </p:cSld>
   <p:clrMapOvr>
     <a:masterClrMapping/>
@@ -3492,9 +3194,9 @@
           <a:bodyPr/>
           <a:lstStyle/>
           <a:p>
-            <a:fld id="{E044B39A-F915-CD4B-9FD5-2BA1DBE98D08}" type="datetime1">
-              <a:rPr lang="en-US" smtClean="0"/>
-              <a:t>11/15/15</a:t>
+            <a:fld id="{A86979CD-FFF9-7242-9605-1394662E390C}" type="datetime1">
+              <a:rPr lang="en-US" smtClean="0"/>
+              <a:t>2/10/17</a:t>
             </a:fld>
             <a:endParaRPr lang="en-US"/>
           </a:p>
@@ -3517,7 +3219,7 @@
           <a:p>
             <a:r>
               <a:rPr lang="sk-SK" smtClean="0"/>
-              <a:t>© 2015 EV3Lessons.com, Last edit 11/15/2015</a:t>
+              <a:t>© 2015 EV3Lessons.com, Last edit 02/10/2017</a:t>
             </a:r>
             <a:endParaRPr lang="en-US"/>
           </a:p>
@@ -3547,11 +3249,7 @@
         </p:txBody>
       </p:sp>
     </p:spTree>
-    <p:extLst>
-      <p:ext uri="{BB962C8B-B14F-4D97-AF65-F5344CB8AC3E}">
-        <p14:creationId xmlns:p14="http://schemas.microsoft.com/office/powerpoint/2010/main" val="2117079612"/>
-      </p:ext>
-    </p:extLst>
+    <p:extLst/>
   </p:cSld>
   <p:clrMapOvr>
     <a:masterClrMapping/>
@@ -3774,9 +3472,9 @@
           <a:bodyPr/>
           <a:lstStyle/>
           <a:p>
-            <a:fld id="{3F033D29-29CD-F543-92C6-2FF62DBDFE49}" type="datetime1">
-              <a:rPr lang="en-US" smtClean="0"/>
-              <a:t>11/15/15</a:t>
+            <a:fld id="{CC562F8C-A989-7740-8C35-7063E056B0F8}" type="datetime1">
+              <a:rPr lang="en-US" smtClean="0"/>
+              <a:t>2/10/17</a:t>
             </a:fld>
             <a:endParaRPr lang="en-US"/>
           </a:p>
@@ -3799,7 +3497,7 @@
           <a:p>
             <a:r>
               <a:rPr lang="sk-SK" smtClean="0"/>
-              <a:t>© 2015 EV3Lessons.com, Last edit 11/15/2015</a:t>
+              <a:t>© 2015 EV3Lessons.com, Last edit 02/10/2017</a:t>
             </a:r>
             <a:endParaRPr lang="en-US"/>
           </a:p>
@@ -3829,11 +3527,7 @@
         </p:txBody>
       </p:sp>
     </p:spTree>
-    <p:extLst>
-      <p:ext uri="{BB962C8B-B14F-4D97-AF65-F5344CB8AC3E}">
-        <p14:creationId xmlns:p14="http://schemas.microsoft.com/office/powerpoint/2010/main" val="100491741"/>
-      </p:ext>
-    </p:extLst>
+    <p:extLst/>
   </p:cSld>
   <p:clrMapOvr>
     <a:masterClrMapping/>
@@ -4094,9 +3788,9 @@
           <a:bodyPr/>
           <a:lstStyle/>
           <a:p>
-            <a:fld id="{05009D79-4CCC-0B42-A2B7-DA2F419D8D4B}" type="datetime1">
-              <a:rPr lang="en-US" smtClean="0"/>
-              <a:t>11/15/15</a:t>
+            <a:fld id="{B5E89777-1166-364A-8950-3AA9DF1FEF55}" type="datetime1">
+              <a:rPr lang="en-US" smtClean="0"/>
+              <a:t>2/10/17</a:t>
             </a:fld>
             <a:endParaRPr lang="en-US"/>
           </a:p>
@@ -4119,7 +3813,7 @@
           <a:p>
             <a:r>
               <a:rPr lang="sk-SK" smtClean="0"/>
-              <a:t>© 2015 EV3Lessons.com, Last edit 11/15/2015</a:t>
+              <a:t>© 2015 EV3Lessons.com, Last edit 02/10/2017</a:t>
             </a:r>
             <a:endParaRPr lang="en-US"/>
           </a:p>
@@ -4172,11 +3866,7 @@
         </p:txBody>
       </p:sp>
     </p:spTree>
-    <p:extLst>
-      <p:ext uri="{BB962C8B-B14F-4D97-AF65-F5344CB8AC3E}">
-        <p14:creationId xmlns:p14="http://schemas.microsoft.com/office/powerpoint/2010/main" val="1042544445"/>
-      </p:ext>
-    </p:extLst>
+    <p:extLst/>
   </p:cSld>
   <p:clrMapOvr>
     <a:masterClrMapping/>
@@ -4323,9 +4013,9 @@
           <a:bodyPr/>
           <a:lstStyle/>
           <a:p>
-            <a:fld id="{6EE1E28B-B69F-E94E-97D3-9906D7D789E7}" type="datetime1">
-              <a:rPr lang="en-US" smtClean="0"/>
-              <a:t>11/15/15</a:t>
+            <a:fld id="{C5ADF7F7-D98D-C54F-90E0-B49C970D32FC}" type="datetime1">
+              <a:rPr lang="en-US" smtClean="0"/>
+              <a:t>2/10/17</a:t>
             </a:fld>
             <a:endParaRPr lang="en-US"/>
           </a:p>
@@ -4348,7 +4038,7 @@
           <a:p>
             <a:r>
               <a:rPr lang="sk-SK" smtClean="0"/>
-              <a:t>© 2015 EV3Lessons.com, Last edit 11/15/2015</a:t>
+              <a:t>© 2015 EV3Lessons.com, Last edit 02/10/2017</a:t>
             </a:r>
             <a:endParaRPr lang="en-US"/>
           </a:p>
@@ -4536,11 +4226,7 @@
         </p:sp>
       </p:grpSp>
     </p:spTree>
-    <p:extLst>
-      <p:ext uri="{BB962C8B-B14F-4D97-AF65-F5344CB8AC3E}">
-        <p14:creationId xmlns:p14="http://schemas.microsoft.com/office/powerpoint/2010/main" val="725411242"/>
-      </p:ext>
-    </p:extLst>
+    <p:extLst/>
   </p:cSld>
   <p:clrMapOvr>
     <a:masterClrMapping/>
@@ -4610,9 +4296,9 @@
           <a:bodyPr/>
           <a:lstStyle/>
           <a:p>
-            <a:fld id="{26A65F56-F9C8-A44F-B6D5-F8F65EDC1DA1}" type="datetime1">
-              <a:rPr lang="en-US" smtClean="0"/>
-              <a:t>11/15/15</a:t>
+            <a:fld id="{34091D6A-0EEF-B848-9461-B9F58736F8BE}" type="datetime1">
+              <a:rPr lang="en-US" smtClean="0"/>
+              <a:t>2/10/17</a:t>
             </a:fld>
             <a:endParaRPr lang="en-US" dirty="0"/>
           </a:p>
@@ -4635,7 +4321,7 @@
           <a:p>
             <a:r>
               <a:rPr lang="sk-SK" smtClean="0"/>
-              <a:t>© 2015 EV3Lessons.com, Last edit 11/15/2015</a:t>
+              <a:t>© 2015 EV3Lessons.com, Last edit 02/10/2017</a:t>
             </a:r>
             <a:endParaRPr lang="en-US" dirty="0"/>
           </a:p>
@@ -4722,11 +4408,7 @@
         </p:txBody>
       </p:sp>
     </p:spTree>
-    <p:extLst>
-      <p:ext uri="{BB962C8B-B14F-4D97-AF65-F5344CB8AC3E}">
-        <p14:creationId xmlns:p14="http://schemas.microsoft.com/office/powerpoint/2010/main" val="722080275"/>
-      </p:ext>
-    </p:extLst>
+    <p:extLst/>
   </p:cSld>
   <p:clrMapOvr>
     <a:masterClrMapping/>
@@ -4854,9 +4536,9 @@
             </a:lvl1pPr>
           </a:lstStyle>
           <a:p>
-            <a:fld id="{D410A861-43AC-9E4E-A42C-00CD573E30E9}" type="datetime1">
-              <a:rPr lang="en-US" smtClean="0"/>
-              <a:t>11/15/15</a:t>
+            <a:fld id="{FD205A87-4E58-FD4E-BDEA-6DA3ED38F3D7}" type="datetime1">
+              <a:rPr lang="en-US" smtClean="0"/>
+              <a:t>2/10/17</a:t>
             </a:fld>
             <a:endParaRPr lang="en-US" dirty="0"/>
           </a:p>
@@ -4897,7 +4579,7 @@
           <a:p>
             <a:r>
               <a:rPr lang="sk-SK" smtClean="0"/>
-              <a:t>© 2015 EV3Lessons.com, Last edit 11/15/2015</a:t>
+              <a:t>© 2015 EV3Lessons.com, Last edit 02/10/2017</a:t>
             </a:r>
             <a:endParaRPr lang="en-US" dirty="0"/>
           </a:p>
@@ -4986,21 +4668,21 @@
     </p:spTree>
     <p:extLst>
       <p:ext uri="{BB962C8B-B14F-4D97-AF65-F5344CB8AC3E}">
-        <p14:creationId xmlns:p14="http://schemas.microsoft.com/office/powerpoint/2010/main" val="817326882"/>
+        <p14:creationId xmlns:p14="http://schemas.microsoft.com/office/powerpoint/2010/main" val="1927404771"/>
       </p:ext>
     </p:extLst>
   </p:cSld>
   <p:clrMap bg1="lt1" tx1="dk1" bg2="lt2" tx2="dk2" accent1="accent1" accent2="accent2" accent3="accent3" accent4="accent4" accent5="accent5" accent6="accent6" hlink="hlink" folHlink="folHlink"/>
   <p:sldLayoutIdLst>
-    <p:sldLayoutId id="2147483836" r:id="rId1"/>
-    <p:sldLayoutId id="2147483837" r:id="rId2"/>
-    <p:sldLayoutId id="2147483838" r:id="rId3"/>
-    <p:sldLayoutId id="2147483839" r:id="rId4"/>
-    <p:sldLayoutId id="2147483840" r:id="rId5"/>
-    <p:sldLayoutId id="2147483841" r:id="rId6"/>
-    <p:sldLayoutId id="2147483842" r:id="rId7"/>
-    <p:sldLayoutId id="2147483843" r:id="rId8"/>
-    <p:sldLayoutId id="2147483844" r:id="rId9"/>
+    <p:sldLayoutId id="2147483846" r:id="rId1"/>
+    <p:sldLayoutId id="2147483847" r:id="rId2"/>
+    <p:sldLayoutId id="2147483848" r:id="rId3"/>
+    <p:sldLayoutId id="2147483849" r:id="rId4"/>
+    <p:sldLayoutId id="2147483850" r:id="rId5"/>
+    <p:sldLayoutId id="2147483851" r:id="rId6"/>
+    <p:sldLayoutId id="2147483852" r:id="rId7"/>
+    <p:sldLayoutId id="2147483853" r:id="rId8"/>
+    <p:sldLayoutId id="2147483854" r:id="rId9"/>
   </p:sldLayoutIdLst>
   <p:timing>
     <p:tnLst>
@@ -5404,10 +5086,43 @@
           <a:bodyPr/>
           <a:lstStyle/>
           <a:p>
-            <a:endParaRPr lang="en-US"/>
-          </a:p>
-        </p:txBody>
-      </p:sp>
+            <a:r>
+              <a:rPr lang="en-US" dirty="0" smtClean="0"/>
+              <a:t>By Sanjay and Arvind Seshan</a:t>
+            </a:r>
+            <a:endParaRPr lang="en-US" dirty="0"/>
+          </a:p>
+        </p:txBody>
+      </p:sp>
+      <p:pic>
+        <p:nvPicPr>
+          <p:cNvPr id="4" name="Picture 3"/>
+          <p:cNvPicPr>
+            <a:picLocks noChangeAspect="1"/>
+          </p:cNvPicPr>
+          <p:nvPr/>
+        </p:nvPicPr>
+        <p:blipFill rotWithShape="1">
+          <a:blip r:embed="rId2">
+            <a:extLst>
+              <a:ext uri="{28A0092B-C50C-407E-A947-70E740481C1C}">
+                <a14:useLocalDpi xmlns:a14="http://schemas.microsoft.com/office/drawing/2010/main" val="0"/>
+              </a:ext>
+            </a:extLst>
+          </a:blip>
+          <a:srcRect l="4523" t="17619" r="3095" b="25000"/>
+          <a:stretch/>
+        </p:blipFill>
+        <p:spPr>
+          <a:xfrm>
+            <a:off x="3459013" y="4560129"/>
+            <a:ext cx="2225974" cy="1382629"/>
+          </a:xfrm>
+          <a:prstGeom prst="rect">
+            <a:avLst/>
+          </a:prstGeom>
+        </p:spPr>
+      </p:pic>
     </p:spTree>
     <p:extLst>
       <p:ext uri="{BB962C8B-B14F-4D97-AF65-F5344CB8AC3E}">
@@ -5498,7 +5213,7 @@
           <a:p>
             <a:r>
               <a:rPr lang="sk-SK" smtClean="0"/>
-              <a:t>© 2015 EV3Lessons.com, Last edit 11/15/2015</a:t>
+              <a:t>© 2015 EV3Lessons.com, Last edit 02/10/2017</a:t>
             </a:r>
             <a:endParaRPr lang="en-US"/>
           </a:p>
@@ -5644,7 +5359,7 @@
           <a:p>
             <a:r>
               <a:rPr lang="sk-SK" smtClean="0"/>
-              <a:t>© 2015 EV3Lessons.com, Last edit 11/15/2015</a:t>
+              <a:t>© 2015 EV3Lessons.com, Last edit 02/10/2017</a:t>
             </a:r>
             <a:endParaRPr lang="en-US"/>
           </a:p>
@@ -5906,6 +5621,38 @@
       </p:grpSpPr>
       <p:sp>
         <p:nvSpPr>
+          <p:cNvPr id="25" name="Content Placeholder 2"/>
+          <p:cNvSpPr>
+            <a:spLocks noGrp="1"/>
+          </p:cNvSpPr>
+          <p:nvPr>
+            <p:ph idx="1"/>
+          </p:nvPr>
+        </p:nvSpPr>
+        <p:spPr>
+          <a:xfrm>
+            <a:off x="3823965" y="3803028"/>
+            <a:ext cx="5104571" cy="828448"/>
+          </a:xfrm>
+        </p:spPr>
+        <p:txBody>
+          <a:bodyPr>
+            <a:noAutofit/>
+          </a:bodyPr>
+          <a:lstStyle/>
+          <a:p>
+            <a:pPr marL="0" indent="0">
+              <a:buNone/>
+            </a:pPr>
+            <a:r>
+              <a:rPr lang="en-US" sz="1800" dirty="0" smtClean="0"/>
+              <a:t>C. You must create a variable and give it a name before using it.</a:t>
+            </a:r>
+          </a:p>
+        </p:txBody>
+      </p:sp>
+      <p:sp>
+        <p:nvSpPr>
           <p:cNvPr id="4" name="Footer Placeholder 3"/>
           <p:cNvSpPr>
             <a:spLocks noGrp="1"/>
@@ -5921,7 +5668,7 @@
           <a:p>
             <a:r>
               <a:rPr lang="sk-SK" smtClean="0"/>
-              <a:t>© 2015 EV3Lessons.com, Last edit 11/15/2015</a:t>
+              <a:t>© 2015 EV3Lessons.com, Last edit 02/10/2017</a:t>
             </a:r>
             <a:endParaRPr lang="en-US" dirty="0"/>
           </a:p>
@@ -6417,38 +6164,6 @@
       </p:sp>
       <p:sp>
         <p:nvSpPr>
-          <p:cNvPr id="25" name="Content Placeholder 2"/>
-          <p:cNvSpPr>
-            <a:spLocks noGrp="1"/>
-          </p:cNvSpPr>
-          <p:nvPr>
-            <p:ph idx="1"/>
-          </p:nvPr>
-        </p:nvSpPr>
-        <p:spPr>
-          <a:xfrm>
-            <a:off x="3823965" y="3803028"/>
-            <a:ext cx="5104571" cy="828448"/>
-          </a:xfrm>
-        </p:spPr>
-        <p:txBody>
-          <a:bodyPr>
-            <a:noAutofit/>
-          </a:bodyPr>
-          <a:lstStyle/>
-          <a:p>
-            <a:pPr marL="0" indent="0">
-              <a:buNone/>
-            </a:pPr>
-            <a:r>
-              <a:rPr lang="en-US" sz="1800" dirty="0" smtClean="0"/>
-              <a:t>C. You must create a variable and give it a name before using it.</a:t>
-            </a:r>
-          </a:p>
-        </p:txBody>
-      </p:sp>
-      <p:sp>
-        <p:nvSpPr>
           <p:cNvPr id="22" name="Rectangle 21"/>
           <p:cNvSpPr/>
           <p:nvPr/>
@@ -6640,24 +6355,8 @@
           <a:lstStyle/>
           <a:p>
             <a:r>
-              <a:rPr lang="sk-SK" dirty="0" smtClean="0"/>
-              <a:t>© 2015 EV3Lessons.com, </a:t>
-            </a:r>
-            <a:r>
-              <a:rPr lang="sk-SK" dirty="0" err="1" smtClean="0"/>
-              <a:t>Last</a:t>
-            </a:r>
-            <a:r>
-              <a:rPr lang="sk-SK" dirty="0" smtClean="0"/>
-              <a:t> </a:t>
-            </a:r>
-            <a:r>
-              <a:rPr lang="sk-SK" dirty="0" err="1" smtClean="0"/>
-              <a:t>edit</a:t>
-            </a:r>
-            <a:r>
-              <a:rPr lang="sk-SK" dirty="0" smtClean="0"/>
-              <a:t> 11/15/2015</a:t>
+              <a:rPr lang="sk-SK" smtClean="0"/>
+              <a:t>© 2015 EV3Lessons.com, Last edit 02/10/2017</a:t>
             </a:r>
             <a:endParaRPr lang="en-US" dirty="0"/>
           </a:p>
@@ -6893,7 +6592,7 @@
           <a:p>
             <a:r>
               <a:rPr lang="sk-SK" smtClean="0"/>
-              <a:t>© 2015 EV3Lessons.com, Last edit 11/15/2015</a:t>
+              <a:t>© 2015 EV3Lessons.com, Last edit 02/10/2017</a:t>
             </a:r>
             <a:endParaRPr lang="en-US"/>
           </a:p>
@@ -7505,15 +7204,7 @@
           <a:p>
             <a:r>
               <a:rPr lang="en-US" dirty="0" smtClean="0"/>
-              <a:t>If </a:t>
-            </a:r>
-            <a:r>
-              <a:rPr lang="en-US" dirty="0" smtClean="0"/>
-              <a:t>your </a:t>
-            </a:r>
-            <a:r>
-              <a:rPr lang="en-US" dirty="0" smtClean="0"/>
-              <a:t>Menu Action code is long (not just a display and sound), consider creating My Blocks out of your code</a:t>
+              <a:t>If your Menu Action code is long (not just a display and sound), consider creating My Blocks out of your code</a:t>
             </a:r>
           </a:p>
           <a:p>
@@ -7541,7 +7232,7 @@
           <a:p>
             <a:r>
               <a:rPr lang="sk-SK" smtClean="0"/>
-              <a:t>© 2015 EV3Lessons.com, Last edit 11/15/2015</a:t>
+              <a:t>© 2015 EV3Lessons.com, Last edit 02/10/2017</a:t>
             </a:r>
             <a:endParaRPr lang="en-US"/>
           </a:p>
@@ -7684,7 +7375,7 @@
           <a:p>
             <a:r>
               <a:rPr lang="sk-SK" smtClean="0"/>
-              <a:t>© 2015 EV3Lessons.com, Last edit 11/15/2015</a:t>
+              <a:t>© 2015 EV3Lessons.com, Last edit 02/10/2017</a:t>
             </a:r>
             <a:endParaRPr lang="en-US"/>
           </a:p>
@@ -7762,7 +7453,7 @@
           <a:effectLst/>
           <a:extLst>
             <a:ext uri="{91240B29-F687-4f45-9708-019B960494DF}">
-              <a14:hiddenLine xmlns="" xmlns:a14="http://schemas.microsoft.com/office/drawing/2010/main" w="9525">
+              <a14:hiddenLine xmlns:a14="http://schemas.microsoft.com/office/drawing/2010/main" xmlns="" w="9525">
                 <a:solidFill>
                   <a:schemeClr val="tx1"/>
                 </a:solidFill>
@@ -7772,7 +7463,7 @@
               </a14:hiddenLine>
             </a:ext>
             <a:ext uri="{AF507438-7753-43e0-B8FC-AC1667EBCBE1}">
-              <a14:hiddenEffects xmlns="" xmlns:a14="http://schemas.microsoft.com/office/drawing/2010/main">
+              <a14:hiddenEffects xmlns:a14="http://schemas.microsoft.com/office/drawing/2010/main" xmlns="">
                 <a:effectLst>
                   <a:outerShdw dist="35921" dir="2700000" algn="ctr" rotWithShape="0">
                     <a:schemeClr val="bg2"/>
@@ -8125,7 +7816,7 @@
           <a:noFill/>
           <a:extLst>
             <a:ext uri="{909E8E84-426E-40dd-AFC4-6F175D3DCCD1}">
-              <a14:hiddenFill xmlns="" xmlns:a14="http://schemas.microsoft.com/office/drawing/2010/main">
+              <a14:hiddenFill xmlns:a14="http://schemas.microsoft.com/office/drawing/2010/main" xmlns="">
                 <a:solidFill>
                   <a:srgbClr val="FFFFFF"/>
                 </a:solidFill>

</xml_diff>